<commit_message>
posting changes to PPT
</commit_message>
<xml_diff>
--- a/Team7_FP_Presentation_10_08.pptx
+++ b/Team7_FP_Presentation_10_08.pptx
@@ -1139,7 +1139,7 @@
         </p:nvSpPr>
         <p:spPr>
           <a:xfrm>
-            <a:off x="381300" y="685800"/>
+            <a:off x="381000" y="685800"/>
             <a:ext cx="6096000" cy="3429000"/>
           </a:xfrm>
           <a:custGeom>
@@ -1718,7 +1718,7 @@
         </p:nvSpPr>
         <p:spPr>
           <a:xfrm>
-            <a:off x="381300" y="685800"/>
+            <a:off x="381000" y="685800"/>
             <a:ext cx="6096000" cy="3429000"/>
           </a:xfrm>
           <a:custGeom>
@@ -12280,6 +12280,92 @@
           </a:bodyPr>
           <a:lstStyle/>
           <a:p>
+            <a:pPr rtl="0">
+              <a:buFont typeface="Arial" panose="020B0604020202020204" pitchFamily="34" charset="0"/>
+              <a:buChar char="•"/>
+            </a:pPr>
+            <a:r>
+              <a:rPr lang="en-US" dirty="0"/>
+              <a:t>The started notebook included preprocessing code of the dataset using Scikit-</a:t>
+            </a:r>
+            <a:r>
+              <a:rPr lang="en-US" dirty="0" err="1"/>
+              <a:t>Learn’s</a:t>
+            </a:r>
+            <a:r>
+              <a:rPr lang="en-US" dirty="0"/>
+              <a:t> Pipelines and </a:t>
+            </a:r>
+            <a:r>
+              <a:rPr lang="en-US" dirty="0" err="1"/>
+              <a:t>ColumnTransformers</a:t>
+            </a:r>
+            <a:r>
+              <a:rPr lang="en-US" dirty="0"/>
+              <a:t> and as we progressed in understanding the dataset we dropped features that seemed unnecessary and added a few ratio features.</a:t>
+            </a:r>
+          </a:p>
+          <a:p>
+            <a:pPr rtl="0">
+              <a:buFont typeface="Arial" panose="020B0604020202020204" pitchFamily="34" charset="0"/>
+              <a:buChar char="•"/>
+            </a:pPr>
+            <a:r>
+              <a:rPr lang="en-US" dirty="0"/>
+              <a:t>We wrote code that builds a TensorFlow Dataset from the original dataset where each example is generated with sliding windows over the time series dataset. From each (</a:t>
+            </a:r>
+            <a:r>
+              <a:rPr lang="en-US" dirty="0" err="1"/>
+              <a:t>stock_id</a:t>
+            </a:r>
+            <a:r>
+              <a:rPr lang="en-US" dirty="0"/>
+              <a:t>, </a:t>
+            </a:r>
+            <a:r>
+              <a:rPr lang="en-US" dirty="0" err="1"/>
+              <a:t>date_id</a:t>
+            </a:r>
+            <a:r>
+              <a:rPr lang="en-US" dirty="0"/>
+              <a:t>) pair we built 54 examples shifting the entries 1 stride at a time (windowing). </a:t>
+            </a:r>
+          </a:p>
+          <a:p>
+            <a:pPr rtl="0">
+              <a:buFont typeface="Arial" panose="020B0604020202020204" pitchFamily="34" charset="0"/>
+              <a:buChar char="•"/>
+            </a:pPr>
+            <a:r>
+              <a:rPr lang="en-US" dirty="0"/>
+              <a:t>For our initial experiments we allocated two TF Datasets </a:t>
+            </a:r>
+            <a:r>
+              <a:rPr lang="en-US" dirty="0" err="1"/>
+              <a:t>XY_dataset</a:t>
+            </a:r>
+            <a:r>
+              <a:rPr lang="en-US" dirty="0"/>
+              <a:t> and </a:t>
+            </a:r>
+            <a:r>
+              <a:rPr lang="en-US" dirty="0" err="1"/>
+              <a:t>XY_test_dataset</a:t>
+            </a:r>
+            <a:r>
+              <a:rPr lang="en-US" dirty="0"/>
+              <a:t> with 500 and 50 time series groups (each with 54 examples) respectively. The former dataset is used for training and the latter to compute the training MAE and we tested the new preprocessing code with a simple MLP using </a:t>
+            </a:r>
+            <a:r>
+              <a:rPr lang="en-US" dirty="0" err="1"/>
+              <a:t>Keras</a:t>
+            </a:r>
+            <a:r>
+              <a:rPr lang="en-US" dirty="0"/>
+              <a:t>' Sequential API</a:t>
+            </a:r>
+          </a:p>
+          <a:p>
             <a:pPr marL="0" lvl="0" indent="0" algn="l" rtl="0">
               <a:lnSpc>
                 <a:spcPct val="115000"/>
@@ -12297,7 +12383,7 @@
               <a:buFont typeface="Arial"/>
               <a:buNone/>
             </a:pPr>
-            <a:endParaRPr/>
+            <a:endParaRPr dirty="0"/>
           </a:p>
         </p:txBody>
       </p:sp>
@@ -12626,20 +12712,46 @@
           </a:bodyPr>
           <a:lstStyle/>
           <a:p>
-            <a:pPr marL="0" lvl="0" indent="0" algn="l" rtl="0">
+            <a:pPr marL="285750" lvl="0" indent="-285750" algn="l" rtl="0">
               <a:lnSpc>
                 <a:spcPct val="115000"/>
               </a:lnSpc>
-              <a:spcBef>
-                <a:spcPts val="1200"/>
-              </a:spcBef>
-              <a:spcAft>
-                <a:spcPts val="1200"/>
-              </a:spcAft>
               <a:buSzPts val="1800"/>
-              <a:buNone/>
+              <a:buFont typeface="Arial" panose="020B0604020202020204" pitchFamily="34" charset="0"/>
+              <a:buChar char="•"/>
             </a:pPr>
-            <a:endParaRPr/>
+            <a:r>
+              <a:rPr lang="en-US" dirty="0"/>
+              <a:t>Preprocessing</a:t>
+            </a:r>
+          </a:p>
+          <a:p>
+            <a:pPr marL="742950" lvl="1" indent="-285750">
+              <a:buSzPts val="1800"/>
+              <a:buFont typeface="Courier New" panose="02070309020205020404" pitchFamily="49" charset="0"/>
+              <a:buChar char="o"/>
+            </a:pPr>
+            <a:r>
+              <a:rPr lang="en-US" dirty="0"/>
+              <a:t>One of the initial problems we had was not only about the size of the dataset which included 5M examples but also we had to extract the sets of examples that were part of the same time series, that is, a set of examples corresponding to the same 10 minute interval for the same (</a:t>
+            </a:r>
+            <a:r>
+              <a:rPr lang="en-US" dirty="0" err="1"/>
+              <a:t>stock_id</a:t>
+            </a:r>
+            <a:r>
+              <a:rPr lang="en-US" dirty="0"/>
+              <a:t>, </a:t>
+            </a:r>
+            <a:r>
+              <a:rPr lang="en-US" dirty="0" err="1"/>
+              <a:t>date_id</a:t>
+            </a:r>
+            <a:r>
+              <a:rPr lang="en-US" dirty="0"/>
+              <a:t>) pair. Once we identified the groups of examples that formed each time series we worked on constructing a dataset with a sliding window for each group that we can provide to a model that can leverage timing in the data such as RNN/LSTM</a:t>
+            </a:r>
+            <a:endParaRPr dirty="0"/>
           </a:p>
         </p:txBody>
       </p:sp>

</xml_diff>